<commit_message>
Adding some generality to terms
</commit_message>
<xml_diff>
--- a/acisF_PosterSI2PI2016.pptx
+++ b/acisF_PosterSI2PI2016.pptx
@@ -5240,7 +5240,7 @@
         <p:spPr>
           <a:xfrm>
             <a:off x="685800" y="3733799"/>
-            <a:ext cx="15697200" cy="8588305"/>
+            <a:ext cx="15697200" cy="8525991"/>
           </a:xfrm>
           <a:ln w="28575">
             <a:miter lim="800000"/>
@@ -5287,7 +5287,7 @@
                   </a:schemeClr>
                 </a:solidFill>
               </a:rPr>
-              <a:t>Big </a:t>
+              <a:t>Data </a:t>
             </a:r>
             <a:r>
               <a:rPr lang="en-US" sz="2800" b="1" dirty="0">
@@ -5297,7 +5297,7 @@
                   </a:schemeClr>
                 </a:solidFill>
               </a:rPr>
-              <a:t>Data scientists </a:t>
+              <a:t>scientists </a:t>
             </a:r>
             <a:r>
               <a:rPr lang="en-US" sz="2800" dirty="0">
@@ -5586,7 +5586,37 @@
                   </a:schemeClr>
                 </a:solidFill>
               </a:rPr>
-              <a:t>Implementing crowdsourcing or machine learning solution use to demand a lot of </a:t>
+              <a:t>Usually, implementing </a:t>
+            </a:r>
+            <a:r>
+              <a:rPr lang="en-US" sz="2800" dirty="0" smtClean="0">
+                <a:solidFill>
+                  <a:schemeClr val="accent1">
+                    <a:lumMod val="75000"/>
+                  </a:schemeClr>
+                </a:solidFill>
+              </a:rPr>
+              <a:t>crowdsourcing or machine learning </a:t>
+            </a:r>
+            <a:r>
+              <a:rPr lang="en-US" sz="2800" dirty="0" smtClean="0">
+                <a:solidFill>
+                  <a:schemeClr val="accent1">
+                    <a:lumMod val="75000"/>
+                  </a:schemeClr>
+                </a:solidFill>
+              </a:rPr>
+              <a:t>solutions demand </a:t>
+            </a:r>
+            <a:r>
+              <a:rPr lang="en-US" sz="2800" dirty="0" smtClean="0">
+                <a:solidFill>
+                  <a:schemeClr val="accent1">
+                    <a:lumMod val="75000"/>
+                  </a:schemeClr>
+                </a:solidFill>
+              </a:rPr>
+              <a:t>a lot of </a:t>
             </a:r>
             <a:r>
               <a:rPr lang="en-US" sz="2800" b="1" dirty="0" smtClean="0">
@@ -5752,17 +5782,17 @@
                   </a:schemeClr>
                 </a:solidFill>
               </a:rPr>
-              <a:t>During the project, the information extraction process from the scientific </a:t>
-            </a:r>
-            <a:r>
-              <a:rPr lang="en-US" sz="2800" dirty="0">
-                <a:solidFill>
-                  <a:schemeClr val="accent1">
-                    <a:lumMod val="75000"/>
-                  </a:schemeClr>
-                </a:solidFill>
-              </a:rPr>
-              <a:t>data collected by the </a:t>
+              <a:t>The data collected </a:t>
+            </a:r>
+            <a:r>
+              <a:rPr lang="en-US" sz="2800" dirty="0" smtClean="0">
+                <a:solidFill>
+                  <a:schemeClr val="accent1">
+                    <a:lumMod val="75000"/>
+                  </a:schemeClr>
+                </a:solidFill>
+              </a:rPr>
+              <a:t>in the </a:t>
             </a:r>
             <a:r>
               <a:rPr lang="en-US" sz="2800" b="1" dirty="0" smtClean="0">
@@ -5772,7 +5802,17 @@
                   </a:schemeClr>
                 </a:solidFill>
               </a:rPr>
-              <a:t>Integrated Digitized </a:t>
+              <a:t>Integrated </a:t>
+            </a:r>
+            <a:r>
+              <a:rPr lang="en-US" sz="2800" b="1" dirty="0" smtClean="0">
+                <a:solidFill>
+                  <a:schemeClr val="accent1">
+                    <a:lumMod val="75000"/>
+                  </a:schemeClr>
+                </a:solidFill>
+              </a:rPr>
+              <a:t>Digitized </a:t>
             </a:r>
             <a:r>
               <a:rPr lang="en-US" sz="2800" b="1" dirty="0" err="1" smtClean="0">
@@ -5802,7 +5842,17 @@
                   </a:schemeClr>
                 </a:solidFill>
               </a:rPr>
-              <a:t>project will be used as a </a:t>
+              <a:t>project will be used as </a:t>
+            </a:r>
+            <a:r>
+              <a:rPr lang="en-US" sz="2800" dirty="0" smtClean="0">
+                <a:solidFill>
+                  <a:schemeClr val="accent1">
+                    <a:lumMod val="75000"/>
+                  </a:schemeClr>
+                </a:solidFill>
+              </a:rPr>
+              <a:t>a use case or </a:t>
             </a:r>
             <a:r>
               <a:rPr lang="en-US" sz="2800" b="1" dirty="0" smtClean="0">
@@ -5822,15 +5872,16 @@
                   </a:schemeClr>
                 </a:solidFill>
               </a:rPr>
-              <a:t>: </a:t>
-            </a:r>
-            <a:r>
-              <a:rPr lang="en-US" sz="2800" dirty="0">
-                <a:solidFill>
-                  <a:schemeClr val="accent1">
-                    <a:lumMod val="75000"/>
-                  </a:schemeClr>
-                </a:solidFill>
+              <a:t> for information extraction. </a:t>
+            </a:r>
+            <a:r>
+              <a:rPr lang="en-US" sz="2800" dirty="0" smtClean="0">
+                <a:solidFill>
+                  <a:schemeClr val="accent1">
+                    <a:lumMod val="75000"/>
+                  </a:schemeClr>
+                </a:solidFill>
+                <a:hlinkClick r:id="rId3"/>
               </a:rPr>
               <a:t>https://www.idigbio.org</a:t>
             </a:r>
@@ -5842,17 +5893,7 @@
                   </a:schemeClr>
                 </a:solidFill>
               </a:rPr>
-              <a:t>/</a:t>
-            </a:r>
-            <a:r>
-              <a:rPr lang="en-US" sz="2800" dirty="0">
-                <a:solidFill>
-                  <a:schemeClr val="accent1">
-                    <a:lumMod val="75000"/>
-                  </a:schemeClr>
-                </a:solidFill>
-              </a:rPr>
-              <a:t>.</a:t>
+              <a:t> </a:t>
             </a:r>
             <a:endParaRPr lang="en-US" sz="2800" dirty="0" smtClean="0">
               <a:solidFill>
@@ -5970,18 +6011,7 @@
                 </a:solidFill>
                 <a:latin typeface="Myriad Pro"/>
               </a:rPr>
-              <a:t>Human-Intelligent </a:t>
-            </a:r>
-            <a:r>
-              <a:rPr lang="en-US" sz="2800" b="1" dirty="0" smtClean="0">
-                <a:solidFill>
-                  <a:schemeClr val="accent1">
-                    <a:lumMod val="75000"/>
-                  </a:schemeClr>
-                </a:solidFill>
-                <a:latin typeface="Myriad Pro"/>
-              </a:rPr>
-              <a:t>services</a:t>
+              <a:t>Human-Intelligent services</a:t>
             </a:r>
           </a:p>
           <a:p>
@@ -6044,18 +6074,7 @@
                 </a:solidFill>
                 <a:latin typeface="Myriad Pro"/>
               </a:rPr>
-              <a:t>Execution </a:t>
-            </a:r>
-            <a:r>
-              <a:rPr lang="en-US" sz="2800" b="1" dirty="0" smtClean="0">
-                <a:solidFill>
-                  <a:schemeClr val="accent1">
-                    <a:lumMod val="75000"/>
-                  </a:schemeClr>
-                </a:solidFill>
-                <a:latin typeface="Myriad Pro"/>
-              </a:rPr>
-              <a:t>Environments</a:t>
+              <a:t>Execution Environments</a:t>
             </a:r>
           </a:p>
           <a:p>
@@ -6395,15 +6414,7 @@
                   <a:schemeClr val="tx2"/>
                 </a:solidFill>
               </a:rPr>
-              <a:t> </a:t>
-            </a:r>
-            <a:r>
-              <a:rPr lang="en-US" sz="2400" dirty="0" smtClean="0">
-                <a:solidFill>
-                  <a:schemeClr val="tx2"/>
-                </a:solidFill>
-              </a:rPr>
-              <a:t>sensors to detect the number, time, and sequence of user interactions</a:t>
+              <a:t> sensors to detect the number, time, and sequence of user interactions</a:t>
             </a:r>
             <a:endParaRPr lang="en-US" sz="2400" dirty="0">
               <a:solidFill>
@@ -6426,23 +6437,7 @@
                   <a:schemeClr val="tx2"/>
                 </a:solidFill>
               </a:rPr>
-              <a:t>Extending </a:t>
-            </a:r>
-            <a:r>
-              <a:rPr lang="en-US" sz="2400" dirty="0" smtClean="0">
-                <a:solidFill>
-                  <a:schemeClr val="tx2"/>
-                </a:solidFill>
-              </a:rPr>
-              <a:t>PyBossa </a:t>
-            </a:r>
-            <a:r>
-              <a:rPr lang="en-US" sz="2400" dirty="0" smtClean="0">
-                <a:solidFill>
-                  <a:schemeClr val="tx2"/>
-                </a:solidFill>
-              </a:rPr>
-              <a:t>to support configurable and reusable </a:t>
+              <a:t>Extending PyBossa to support configurable and reusable </a:t>
             </a:r>
             <a:r>
               <a:rPr lang="en-US" sz="2400" dirty="0" err="1" smtClean="0">
@@ -7009,17 +7004,7 @@
                   </a:schemeClr>
                 </a:solidFill>
               </a:rPr>
-              <a:t>Future </a:t>
-            </a:r>
-            <a:r>
-              <a:rPr lang="en-US" b="1" dirty="0" smtClean="0">
-                <a:solidFill>
-                  <a:schemeClr val="accent1">
-                    <a:lumMod val="75000"/>
-                  </a:schemeClr>
-                </a:solidFill>
-              </a:rPr>
-              <a:t>Work</a:t>
+              <a:t>Future Work</a:t>
             </a:r>
           </a:p>
           <a:p>
@@ -7081,13 +7066,6 @@
               </a:rPr>
               <a:t>Based on the gained experience, we are going to continue with steps 2 and 1 of the Development Plan, making these software components reusable and the improving the workflows, environment, and efficiency. </a:t>
             </a:r>
-            <a:endParaRPr lang="en-US" sz="3200" dirty="0" smtClean="0">
-              <a:solidFill>
-                <a:schemeClr val="accent1">
-                  <a:lumMod val="75000"/>
-                </a:schemeClr>
-              </a:solidFill>
-            </a:endParaRPr>
           </a:p>
         </p:txBody>
       </p:sp>
@@ -7205,13 +7183,6 @@
               </a:rPr>
               <a:t>Program (Cooperative Agreement EF-1115210).</a:t>
             </a:r>
-            <a:endParaRPr lang="en-US" sz="3200" dirty="0" smtClean="0">
-              <a:solidFill>
-                <a:schemeClr val="accent1">
-                  <a:lumMod val="75000"/>
-                </a:schemeClr>
-              </a:solidFill>
-            </a:endParaRPr>
           </a:p>
         </p:txBody>
       </p:sp>
@@ -7277,7 +7248,17 @@
                   </a:schemeClr>
                 </a:solidFill>
               </a:rPr>
-              <a:t>The hardware platform, software, and </a:t>
+              <a:t>The hardware platform, software, and web site for the </a:t>
+            </a:r>
+            <a:r>
+              <a:rPr lang="en-US" sz="3000" dirty="0" err="1" smtClean="0">
+                <a:solidFill>
+                  <a:schemeClr val="accent1">
+                    <a:lumMod val="75000"/>
+                  </a:schemeClr>
+                </a:solidFill>
+              </a:rPr>
+              <a:t>HuMaIN</a:t>
             </a:r>
             <a:r>
               <a:rPr lang="en-US" sz="3000" dirty="0" smtClean="0">
@@ -7287,17 +7268,17 @@
                   </a:schemeClr>
                 </a:solidFill>
               </a:rPr>
-              <a:t>web site for the </a:t>
-            </a:r>
-            <a:r>
-              <a:rPr lang="en-US" sz="3000" dirty="0" err="1" smtClean="0">
-                <a:solidFill>
-                  <a:schemeClr val="accent1">
-                    <a:lumMod val="75000"/>
-                  </a:schemeClr>
-                </a:solidFill>
-              </a:rPr>
-              <a:t>HuMaIN</a:t>
+              <a:t> Software </a:t>
+            </a:r>
+            <a:r>
+              <a:rPr lang="en-US" sz="3000" dirty="0">
+                <a:solidFill>
+                  <a:schemeClr val="accent1">
+                    <a:lumMod val="75000"/>
+                  </a:schemeClr>
+                </a:solidFill>
+              </a:rPr>
+              <a:t>E</a:t>
             </a:r>
             <a:r>
               <a:rPr lang="en-US" sz="3000" dirty="0" smtClean="0">
@@ -7307,6 +7288,36 @@
                   </a:schemeClr>
                 </a:solidFill>
               </a:rPr>
+              <a:t>lements project was </a:t>
+            </a:r>
+            <a:r>
+              <a:rPr lang="en-US" sz="3000" b="1" dirty="0" smtClean="0">
+                <a:solidFill>
+                  <a:schemeClr val="accent1">
+                    <a:lumMod val="75000"/>
+                  </a:schemeClr>
+                </a:solidFill>
+              </a:rPr>
+              <a:t>setup</a:t>
+            </a:r>
+            <a:r>
+              <a:rPr lang="en-US" sz="3000" dirty="0">
+                <a:solidFill>
+                  <a:schemeClr val="accent1">
+                    <a:lumMod val="75000"/>
+                  </a:schemeClr>
+                </a:solidFill>
+              </a:rPr>
+              <a:t>:</a:t>
+            </a:r>
+            <a:r>
+              <a:rPr lang="en-US" sz="3000" dirty="0" smtClean="0">
+                <a:solidFill>
+                  <a:schemeClr val="accent1">
+                    <a:lumMod val="75000"/>
+                  </a:schemeClr>
+                </a:solidFill>
+              </a:rPr>
               <a:t> </a:t>
             </a:r>
             <a:r>
@@ -7316,90 +7327,9 @@
                     <a:lumMod val="75000"/>
                   </a:schemeClr>
                 </a:solidFill>
-              </a:rPr>
-              <a:t>Software </a:t>
-            </a:r>
-            <a:r>
-              <a:rPr lang="en-US" sz="3000" dirty="0">
-                <a:solidFill>
-                  <a:schemeClr val="accent1">
-                    <a:lumMod val="75000"/>
-                  </a:schemeClr>
-                </a:solidFill>
-              </a:rPr>
-              <a:t>E</a:t>
-            </a:r>
-            <a:r>
-              <a:rPr lang="en-US" sz="3000" dirty="0" smtClean="0">
-                <a:solidFill>
-                  <a:schemeClr val="accent1">
-                    <a:lumMod val="75000"/>
-                  </a:schemeClr>
-                </a:solidFill>
-              </a:rPr>
-              <a:t>lements </a:t>
-            </a:r>
-            <a:r>
-              <a:rPr lang="en-US" sz="3000" dirty="0" smtClean="0">
-                <a:solidFill>
-                  <a:schemeClr val="accent1">
-                    <a:lumMod val="75000"/>
-                  </a:schemeClr>
-                </a:solidFill>
-              </a:rPr>
-              <a:t>project was </a:t>
-            </a:r>
-            <a:r>
-              <a:rPr lang="en-US" sz="3000" b="1" dirty="0" smtClean="0">
-                <a:solidFill>
-                  <a:schemeClr val="accent1">
-                    <a:lumMod val="75000"/>
-                  </a:schemeClr>
-                </a:solidFill>
-              </a:rPr>
-              <a:t>setup</a:t>
-            </a:r>
-            <a:r>
-              <a:rPr lang="en-US" sz="3000" dirty="0">
-                <a:solidFill>
-                  <a:schemeClr val="accent1">
-                    <a:lumMod val="75000"/>
-                  </a:schemeClr>
-                </a:solidFill>
-              </a:rPr>
-              <a:t>:</a:t>
-            </a:r>
-            <a:r>
-              <a:rPr lang="en-US" sz="3000" dirty="0" smtClean="0">
-                <a:solidFill>
-                  <a:schemeClr val="accent1">
-                    <a:lumMod val="75000"/>
-                  </a:schemeClr>
-                </a:solidFill>
-              </a:rPr>
-              <a:t> </a:t>
-            </a:r>
-            <a:r>
-              <a:rPr lang="en-US" sz="3000" dirty="0" smtClean="0">
-                <a:solidFill>
-                  <a:schemeClr val="accent1">
-                    <a:lumMod val="75000"/>
-                  </a:schemeClr>
-                </a:solidFill>
-                <a:hlinkClick r:id="rId3"/>
-              </a:rPr>
-              <a:t>http</a:t>
-            </a:r>
-            <a:r>
-              <a:rPr lang="en-US" sz="3000" dirty="0" smtClean="0">
-                <a:solidFill>
-                  <a:schemeClr val="accent1">
-                    <a:lumMod val="75000"/>
-                  </a:schemeClr>
-                </a:solidFill>
-                <a:hlinkClick r:id="rId3"/>
-              </a:rPr>
-              <a:t>://humain.acis.ufl.edu</a:t>
+                <a:hlinkClick r:id="rId4"/>
+              </a:rPr>
+              <a:t>http://humain.acis.ufl.edu</a:t>
             </a:r>
             <a:endParaRPr lang="en-US" sz="3000" dirty="0" smtClean="0">
               <a:solidFill>
@@ -7445,7 +7375,7 @@
                     <a:lumMod val="75000"/>
                   </a:schemeClr>
                 </a:solidFill>
-                <a:hlinkClick r:id="rId4"/>
+                <a:hlinkClick r:id="rId5"/>
               </a:rPr>
               <a:t>https://</a:t>
             </a:r>
@@ -7456,7 +7386,7 @@
                     <a:lumMod val="75000"/>
                   </a:schemeClr>
                 </a:solidFill>
-                <a:hlinkClick r:id="rId4"/>
+                <a:hlinkClick r:id="rId5"/>
               </a:rPr>
               <a:t>github.com/tmbdev/ocropy</a:t>
             </a:r>
@@ -7468,7 +7398,17 @@
                   </a:schemeClr>
                 </a:solidFill>
               </a:rPr>
-              <a:t>) </a:t>
+              <a:t>) is being tested as the OCR software for the </a:t>
+            </a:r>
+            <a:r>
+              <a:rPr lang="en-US" sz="3000" dirty="0" err="1" smtClean="0">
+                <a:solidFill>
+                  <a:schemeClr val="accent1">
+                    <a:lumMod val="75000"/>
+                  </a:schemeClr>
+                </a:solidFill>
+              </a:rPr>
+              <a:t>HuMaIN</a:t>
             </a:r>
             <a:r>
               <a:rPr lang="en-US" sz="3000" dirty="0" smtClean="0">
@@ -7478,75 +7418,8 @@
                   </a:schemeClr>
                 </a:solidFill>
               </a:rPr>
-              <a:t>is being tested </a:t>
-            </a:r>
-            <a:r>
-              <a:rPr lang="en-US" sz="3000" dirty="0" smtClean="0">
-                <a:solidFill>
-                  <a:schemeClr val="accent1">
-                    <a:lumMod val="75000"/>
-                  </a:schemeClr>
-                </a:solidFill>
-              </a:rPr>
-              <a:t>as </a:t>
-            </a:r>
-            <a:r>
-              <a:rPr lang="en-US" sz="3000" dirty="0" smtClean="0">
-                <a:solidFill>
-                  <a:schemeClr val="accent1">
-                    <a:lumMod val="75000"/>
-                  </a:schemeClr>
-                </a:solidFill>
-              </a:rPr>
-              <a:t>the OCR </a:t>
-            </a:r>
-            <a:r>
-              <a:rPr lang="en-US" sz="3000" dirty="0" smtClean="0">
-                <a:solidFill>
-                  <a:schemeClr val="accent1">
-                    <a:lumMod val="75000"/>
-                  </a:schemeClr>
-                </a:solidFill>
-              </a:rPr>
-              <a:t>software </a:t>
-            </a:r>
-            <a:r>
-              <a:rPr lang="en-US" sz="3000" dirty="0" smtClean="0">
-                <a:solidFill>
-                  <a:schemeClr val="accent1">
-                    <a:lumMod val="75000"/>
-                  </a:schemeClr>
-                </a:solidFill>
-              </a:rPr>
-              <a:t>for the </a:t>
-            </a:r>
-            <a:r>
-              <a:rPr lang="en-US" sz="3000" dirty="0" err="1" smtClean="0">
-                <a:solidFill>
-                  <a:schemeClr val="accent1">
-                    <a:lumMod val="75000"/>
-                  </a:schemeClr>
-                </a:solidFill>
-              </a:rPr>
-              <a:t>HuMaIN</a:t>
-            </a:r>
-            <a:r>
-              <a:rPr lang="en-US" sz="3000" dirty="0" smtClean="0">
-                <a:solidFill>
-                  <a:schemeClr val="accent1">
-                    <a:lumMod val="75000"/>
-                  </a:schemeClr>
-                </a:solidFill>
-              </a:rPr>
               <a:t> project</a:t>
             </a:r>
-            <a:endParaRPr lang="en-US" sz="3000" dirty="0" smtClean="0">
-              <a:solidFill>
-                <a:schemeClr val="accent1">
-                  <a:lumMod val="75000"/>
-                </a:schemeClr>
-              </a:solidFill>
-            </a:endParaRPr>
           </a:p>
           <a:p>
             <a:pPr marL="1031875" lvl="1" indent="-515938" defTabSz="4180088" eaLnBrk="1" fontAlgn="auto" hangingPunct="1">
@@ -7620,7 +7493,7 @@
                 </a:solidFill>
                 <a:latin typeface="Myriad Pro"/>
               </a:rPr>
-              <a:t> </a:t>
+              <a:t> the text area of the </a:t>
             </a:r>
             <a:r>
               <a:rPr lang="en-US" sz="3000" dirty="0" smtClean="0">
@@ -7631,7 +7504,18 @@
                 </a:solidFill>
                 <a:latin typeface="Myriad Pro"/>
               </a:rPr>
-              <a:t>the text area of the image improves importantly the quality of the OCR result.</a:t>
+              <a:t>image has importantly improved the </a:t>
+            </a:r>
+            <a:r>
+              <a:rPr lang="en-US" sz="3000" dirty="0" smtClean="0">
+                <a:solidFill>
+                  <a:schemeClr val="accent1">
+                    <a:lumMod val="75000"/>
+                  </a:schemeClr>
+                </a:solidFill>
+                <a:latin typeface="Myriad Pro"/>
+              </a:rPr>
+              <a:t>quality of the OCR result.</a:t>
             </a:r>
           </a:p>
           <a:p>
@@ -7769,7 +7653,18 @@
                 </a:solidFill>
                 <a:latin typeface="Myriad Pro"/>
               </a:rPr>
-              <a:t>Anybody </a:t>
+              <a:t>Anybody can </a:t>
+            </a:r>
+            <a:r>
+              <a:rPr lang="en-US" sz="3000" b="1" dirty="0" smtClean="0">
+                <a:solidFill>
+                  <a:schemeClr val="accent1">
+                    <a:lumMod val="75000"/>
+                  </a:schemeClr>
+                </a:solidFill>
+                <a:latin typeface="Myriad Pro"/>
+              </a:rPr>
+              <a:t>help us </a:t>
             </a:r>
             <a:r>
               <a:rPr lang="en-US" sz="3000" dirty="0" smtClean="0">
@@ -7780,10 +7675,10 @@
                 </a:solidFill>
                 <a:latin typeface="Myriad Pro"/>
               </a:rPr>
-              <a:t>can </a:t>
-            </a:r>
-            <a:r>
-              <a:rPr lang="en-US" sz="3000" b="1" dirty="0" smtClean="0">
+              <a:t>to complete the </a:t>
+            </a:r>
+            <a:r>
+              <a:rPr lang="en-US" sz="3000" dirty="0">
                 <a:solidFill>
                   <a:schemeClr val="accent1">
                     <a:lumMod val="75000"/>
@@ -7791,7 +7686,7 @@
                 </a:solidFill>
                 <a:latin typeface="Myriad Pro"/>
               </a:rPr>
-              <a:t>help us </a:t>
+              <a:t>crowdsourcing tasks at: </a:t>
             </a:r>
             <a:r>
               <a:rPr lang="en-US" sz="3000" dirty="0" smtClean="0">
@@ -7802,7 +7697,19 @@
                 </a:solidFill>
                 <a:latin typeface="Myriad Pro"/>
               </a:rPr>
-              <a:t>to complete the </a:t>
+              <a:t>       	</a:t>
+            </a:r>
+            <a:r>
+              <a:rPr lang="en-US" sz="3000" dirty="0" smtClean="0">
+                <a:solidFill>
+                  <a:schemeClr val="accent1">
+                    <a:lumMod val="75000"/>
+                  </a:schemeClr>
+                </a:solidFill>
+                <a:latin typeface="Myriad Pro"/>
+                <a:hlinkClick r:id="rId6"/>
+              </a:rPr>
+              <a:t>http</a:t>
             </a:r>
             <a:r>
               <a:rPr lang="en-US" sz="3000" dirty="0">
@@ -7812,8 +7719,9 @@
                   </a:schemeClr>
                 </a:solidFill>
                 <a:latin typeface="Myriad Pro"/>
-              </a:rPr>
-              <a:t>crowdsourcing tasks at: </a:t>
+                <a:hlinkClick r:id="rId6"/>
+              </a:rPr>
+              <a:t>://</a:t>
             </a:r>
             <a:r>
               <a:rPr lang="en-US" sz="3000" dirty="0" smtClean="0">
@@ -7823,42 +7731,7 @@
                   </a:schemeClr>
                 </a:solidFill>
                 <a:latin typeface="Myriad Pro"/>
-              </a:rPr>
-              <a:t>       	</a:t>
-            </a:r>
-            <a:r>
-              <a:rPr lang="en-US" sz="3000" dirty="0" smtClean="0">
-                <a:solidFill>
-                  <a:schemeClr val="accent1">
-                    <a:lumMod val="75000"/>
-                  </a:schemeClr>
-                </a:solidFill>
-                <a:latin typeface="Myriad Pro"/>
-                <a:hlinkClick r:id="rId5"/>
-              </a:rPr>
-              <a:t>http</a:t>
-            </a:r>
-            <a:r>
-              <a:rPr lang="en-US" sz="3000" dirty="0">
-                <a:solidFill>
-                  <a:schemeClr val="accent1">
-                    <a:lumMod val="75000"/>
-                  </a:schemeClr>
-                </a:solidFill>
-                <a:latin typeface="Myriad Pro"/>
-                <a:hlinkClick r:id="rId5"/>
-              </a:rPr>
-              <a:t>://</a:t>
-            </a:r>
-            <a:r>
-              <a:rPr lang="en-US" sz="3000" dirty="0" smtClean="0">
-                <a:solidFill>
-                  <a:schemeClr val="accent1">
-                    <a:lumMod val="75000"/>
-                  </a:schemeClr>
-                </a:solidFill>
-                <a:latin typeface="Myriad Pro"/>
-                <a:hlinkClick r:id="rId5"/>
+                <a:hlinkClick r:id="rId6"/>
               </a:rPr>
               <a:t>humain.acis.ufl.edu/app.html</a:t>
             </a:r>
@@ -8017,27 +7890,7 @@
                   </a:schemeClr>
                 </a:solidFill>
               </a:rPr>
-              <a:t>for information extraction have weaknesses that the </a:t>
-            </a:r>
-            <a:r>
-              <a:rPr lang="en-US" sz="3200" dirty="0" smtClean="0">
-                <a:solidFill>
-                  <a:schemeClr val="accent1">
-                    <a:lumMod val="75000"/>
-                  </a:schemeClr>
-                </a:solidFill>
-              </a:rPr>
-              <a:t>integration of human- and machine-intelligent processes </a:t>
-            </a:r>
-            <a:r>
-              <a:rPr lang="en-US" sz="3200" dirty="0" smtClean="0">
-                <a:solidFill>
-                  <a:schemeClr val="accent1">
-                    <a:lumMod val="75000"/>
-                  </a:schemeClr>
-                </a:solidFill>
-              </a:rPr>
-              <a:t>can improve.</a:t>
+              <a:t>for information extraction have weaknesses that the integration of human- and machine-intelligent processes can improve.</a:t>
             </a:r>
           </a:p>
           <a:p>
@@ -8087,7 +7940,7 @@
                   </a:schemeClr>
                 </a:solidFill>
               </a:rPr>
-              <a:t> project will provide a platform of </a:t>
+              <a:t> project will provide a platform </a:t>
             </a:r>
             <a:r>
               <a:rPr lang="en-US" sz="3200" dirty="0" smtClean="0">
@@ -8097,6 +7950,16 @@
                   </a:schemeClr>
                 </a:solidFill>
               </a:rPr>
+              <a:t>of reusable </a:t>
+            </a:r>
+            <a:r>
+              <a:rPr lang="en-US" sz="3200" dirty="0" smtClean="0">
+                <a:solidFill>
+                  <a:schemeClr val="accent1">
+                    <a:lumMod val="75000"/>
+                  </a:schemeClr>
+                </a:solidFill>
+              </a:rPr>
               <a:t>services </a:t>
             </a:r>
             <a:r>
@@ -8107,7 +7970,7 @@
                   </a:schemeClr>
                 </a:solidFill>
               </a:rPr>
-              <a:t>to </a:t>
+              <a:t>for the </a:t>
             </a:r>
             <a:r>
               <a:rPr lang="en-US" sz="3200" dirty="0" smtClean="0">
@@ -8117,8 +7980,35 @@
                   </a:schemeClr>
                 </a:solidFill>
               </a:rPr>
-              <a:t>reuse the human- and machine-intelligent processes in other areas of knowledge.</a:t>
-            </a:r>
+              <a:t>human- and </a:t>
+            </a:r>
+            <a:r>
+              <a:rPr lang="en-US" sz="3200" smtClean="0">
+                <a:solidFill>
+                  <a:schemeClr val="accent1">
+                    <a:lumMod val="75000"/>
+                  </a:schemeClr>
+                </a:solidFill>
+              </a:rPr>
+              <a:t>machine-intelligent </a:t>
+            </a:r>
+            <a:r>
+              <a:rPr lang="en-US" sz="3200" smtClean="0">
+                <a:solidFill>
+                  <a:schemeClr val="accent1">
+                    <a:lumMod val="75000"/>
+                  </a:schemeClr>
+                </a:solidFill>
+              </a:rPr>
+              <a:t>processing.</a:t>
+            </a:r>
+            <a:endParaRPr lang="en-US" sz="3200" dirty="0" smtClean="0">
+              <a:solidFill>
+                <a:schemeClr val="accent1">
+                  <a:lumMod val="75000"/>
+                </a:schemeClr>
+              </a:solidFill>
+            </a:endParaRPr>
           </a:p>
         </p:txBody>
       </p:sp>
@@ -8383,7 +8273,7 @@
           <p:nvPr/>
         </p:nvPicPr>
         <p:blipFill>
-          <a:blip r:embed="rId6" cstate="print">
+          <a:blip r:embed="rId7" cstate="print">
             <a:extLst>
               <a:ext uri="{28A0092B-C50C-407E-A947-70E740481C1C}">
                 <a14:useLocalDpi xmlns:a14="http://schemas.microsoft.com/office/drawing/2010/main" val="0"/>
@@ -8432,7 +8322,7 @@
           <p:nvPr/>
         </p:nvPicPr>
         <p:blipFill>
-          <a:blip r:embed="rId7">
+          <a:blip r:embed="rId8">
             <a:extLst>
               <a:ext uri="{28A0092B-C50C-407E-A947-70E740481C1C}">
                 <a14:useLocalDpi xmlns:a14="http://schemas.microsoft.com/office/drawing/2010/main" val="0"/>
@@ -8462,7 +8352,7 @@
           <p:nvPr/>
         </p:nvPicPr>
         <p:blipFill>
-          <a:blip r:embed="rId8" cstate="print">
+          <a:blip r:embed="rId9" cstate="print">
             <a:extLst>
               <a:ext uri="{28A0092B-C50C-407E-A947-70E740481C1C}">
                 <a14:useLocalDpi xmlns:a14="http://schemas.microsoft.com/office/drawing/2010/main" val="0"/>
@@ -8613,15 +8503,7 @@
           <a:p>
             <a:r>
               <a:rPr lang="en-US" sz="1600" dirty="0" smtClean="0"/>
-              <a:t>3' </a:t>
-            </a:r>
-            <a:r>
-              <a:rPr lang="en-US" sz="1600" dirty="0" smtClean="0"/>
-              <a:t>herb </a:t>
-            </a:r>
-            <a:r>
-              <a:rPr lang="en-US" sz="1600" dirty="0" smtClean="0"/>
-              <a:t>; </a:t>
+              <a:t>3' herb ; </a:t>
             </a:r>
             <a:r>
               <a:rPr lang="en-US" sz="1600" dirty="0" err="1" smtClean="0"/>
@@ -8652,15 +8534,7 @@
             </a:r>
             <a:r>
               <a:rPr lang="en-US" sz="1600" dirty="0" smtClean="0"/>
-              <a:t>, Juan Santiago, </a:t>
-            </a:r>
-            <a:r>
-              <a:rPr lang="en-US" sz="1600" dirty="0" smtClean="0"/>
-              <a:t>Hondo </a:t>
-            </a:r>
-            <a:r>
-              <a:rPr lang="en-US" sz="1600" dirty="0" smtClean="0"/>
-              <a:t>Valle.</a:t>
+              <a:t>, Juan Santiago, Hondo Valle.</a:t>
             </a:r>
           </a:p>
           <a:p>
@@ -9070,7 +8944,7 @@
             <a:prstTxWarp prst="textNoShape">
               <a:avLst/>
             </a:prstTxWarp>
-            <a:normAutofit fontScale="92500"/>
+            <a:normAutofit lnSpcReduction="10000"/>
           </a:bodyPr>
           <a:lstStyle>
             <a:lvl1pPr marL="1566863" indent="-1566863" algn="l" defTabSz="4179888" rtl="0" eaLnBrk="0" fontAlgn="base" hangingPunct="0">
@@ -9299,7 +9173,47 @@
                   </a:schemeClr>
                 </a:solidFill>
               </a:rPr>
-              <a:t>: Data cleaning, multiple formats, incomplete data, natural language processing, field value standardization, consensus, processes efficiency, data completion, deduplication, ambiguity, spelling errors, dictionaries, abbreviations / data truncation.</a:t>
+              <a:t>: Data cleaning, multiple formats, incomplete </a:t>
+            </a:r>
+            <a:r>
+              <a:rPr lang="en-US" sz="3200" dirty="0" smtClean="0">
+                <a:solidFill>
+                  <a:schemeClr val="accent1">
+                    <a:lumMod val="75000"/>
+                  </a:schemeClr>
+                </a:solidFill>
+              </a:rPr>
+              <a:t>data / completion, </a:t>
+            </a:r>
+            <a:r>
+              <a:rPr lang="en-US" sz="3200" dirty="0" smtClean="0">
+                <a:solidFill>
+                  <a:schemeClr val="accent1">
+                    <a:lumMod val="75000"/>
+                  </a:schemeClr>
+                </a:solidFill>
+              </a:rPr>
+              <a:t>natural language processing, field value standardization, consensus, </a:t>
+            </a:r>
+            <a:r>
+              <a:rPr lang="en-US" sz="3200" dirty="0" smtClean="0">
+                <a:solidFill>
+                  <a:schemeClr val="accent1">
+                    <a:lumMod val="75000"/>
+                  </a:schemeClr>
+                </a:solidFill>
+              </a:rPr>
+              <a:t>process efficiency, </a:t>
+            </a:r>
+            <a:r>
+              <a:rPr lang="en-US" sz="3200" dirty="0" smtClean="0">
+                <a:solidFill>
+                  <a:schemeClr val="accent1">
+                    <a:lumMod val="75000"/>
+                  </a:schemeClr>
+                </a:solidFill>
+              </a:rPr>
+              <a:t>deduplication, ambiguity, spelling errors, dictionaries, abbreviations / data truncation.</a:t>
             </a:r>
           </a:p>
           <a:p>

</xml_diff>